<commit_message>
presentation func req excel fin
</commit_message>
<xml_diff>
--- a/presentation/partyCommFuncReqOverAll.pptx
+++ b/presentation/partyCommFuncReqOverAll.pptx
@@ -111,6 +111,11 @@
       </a:defRPr>
     </a:lvl9pPr>
   </p:defaultTextStyle>
+  <p:extLst>
+    <p:ext uri="{EFAFB233-063F-42B5-8137-9DF3F51BA10A}">
+      <p15:sldGuideLst xmlns:p15="http://schemas.microsoft.com/office/powerpoint/2012/main"/>
+    </p:ext>
+  </p:extLst>
 </p:presentation>
 </file>
 
@@ -263,7 +268,7 @@
           <a:p>
             <a:fld id="{C128FA71-3A18-48C0-980F-4B68F7F63042}" type="datetime1">
               <a:rPr lang="en-US" smtClean="0"/>
-              <a:t>6/24/2025</a:t>
+              <a:t>6/25/2025</a:t>
             </a:fld>
             <a:endParaRPr lang="en-US"/>
           </a:p>
@@ -463,7 +468,7 @@
           <a:p>
             <a:fld id="{7104EDB3-C0E8-45F8-9E1D-1B6C8D1880C0}" type="datetime1">
               <a:rPr lang="en-US" smtClean="0"/>
-              <a:t>6/24/2025</a:t>
+              <a:t>6/25/2025</a:t>
             </a:fld>
             <a:endParaRPr lang="en-US"/>
           </a:p>
@@ -673,7 +678,7 @@
           <a:p>
             <a:fld id="{9CF0EC4B-54ED-4041-B552-9BA760FA3DBA}" type="datetime1">
               <a:rPr lang="en-US" smtClean="0"/>
-              <a:t>6/24/2025</a:t>
+              <a:t>6/25/2025</a:t>
             </a:fld>
             <a:endParaRPr lang="en-US"/>
           </a:p>
@@ -873,7 +878,7 @@
           <a:p>
             <a:fld id="{51C1210E-201E-4473-82AC-2466F5386C38}" type="datetime1">
               <a:rPr lang="en-US" smtClean="0"/>
-              <a:t>6/24/2025</a:t>
+              <a:t>6/25/2025</a:t>
             </a:fld>
             <a:endParaRPr lang="en-US"/>
           </a:p>
@@ -1149,7 +1154,7 @@
           <a:p>
             <a:fld id="{B01EA198-6CAB-4B8F-B93F-1F9C8C4B6CE7}" type="datetime1">
               <a:rPr lang="en-US" smtClean="0"/>
-              <a:t>6/24/2025</a:t>
+              <a:t>6/25/2025</a:t>
             </a:fld>
             <a:endParaRPr lang="en-US"/>
           </a:p>
@@ -1417,7 +1422,7 @@
           <a:p>
             <a:fld id="{CA06041F-4525-44D5-AA4F-332294BF1F56}" type="datetime1">
               <a:rPr lang="en-US" smtClean="0"/>
-              <a:t>6/24/2025</a:t>
+              <a:t>6/25/2025</a:t>
             </a:fld>
             <a:endParaRPr lang="en-US"/>
           </a:p>
@@ -1832,7 +1837,7 @@
           <a:p>
             <a:fld id="{F9557091-BBDF-4EB9-BA6B-2BB67AC4FC0F}" type="datetime1">
               <a:rPr lang="en-US" smtClean="0"/>
-              <a:t>6/24/2025</a:t>
+              <a:t>6/25/2025</a:t>
             </a:fld>
             <a:endParaRPr lang="en-US"/>
           </a:p>
@@ -1974,7 +1979,7 @@
           <a:p>
             <a:fld id="{2D6B226B-77A6-410C-9796-083F278E0125}" type="datetime1">
               <a:rPr lang="en-US" smtClean="0"/>
-              <a:t>6/24/2025</a:t>
+              <a:t>6/25/2025</a:t>
             </a:fld>
             <a:endParaRPr lang="en-US"/>
           </a:p>
@@ -2087,7 +2092,7 @@
           <a:p>
             <a:fld id="{A23A578B-D289-4C40-8593-3D356C49DA58}" type="datetime1">
               <a:rPr lang="en-US" smtClean="0"/>
-              <a:t>6/24/2025</a:t>
+              <a:t>6/25/2025</a:t>
             </a:fld>
             <a:endParaRPr lang="en-US"/>
           </a:p>
@@ -2400,7 +2405,7 @@
           <a:p>
             <a:fld id="{713DFAE3-14DB-48A7-A80F-80DDB072CE3D}" type="datetime1">
               <a:rPr lang="en-US" smtClean="0"/>
-              <a:t>6/24/2025</a:t>
+              <a:t>6/25/2025</a:t>
             </a:fld>
             <a:endParaRPr lang="en-US"/>
           </a:p>
@@ -2689,7 +2694,7 @@
           <a:p>
             <a:fld id="{92C5EAEF-6478-4102-8F5D-A5FE9FC97ACB}" type="datetime1">
               <a:rPr lang="en-US" smtClean="0"/>
-              <a:t>6/24/2025</a:t>
+              <a:t>6/25/2025</a:t>
             </a:fld>
             <a:endParaRPr lang="en-US"/>
           </a:p>
@@ -2932,7 +2937,7 @@
           <a:p>
             <a:fld id="{67F45AC6-C491-4585-A584-9CE2AF7D5500}" type="datetime1">
               <a:rPr lang="en-US" smtClean="0"/>
-              <a:t>6/24/2025</a:t>
+              <a:t>6/25/2025</a:t>
             </a:fld>
             <a:endParaRPr lang="en-US"/>
           </a:p>
@@ -5203,7 +5208,7 @@
                 <a:ea typeface="Tahoma" panose="020B0604030504040204" pitchFamily="34" charset="0"/>
                 <a:cs typeface="Tahoma" panose="020B0604030504040204" pitchFamily="34" charset="0"/>
               </a:rPr>
-              <a:t>CRUD EEOC (inside person detail page)</a:t>
+              <a:t>CRUD EEOC classification (inside person detail page)</a:t>
             </a:r>
           </a:p>
           <a:p>
@@ -5218,7 +5223,7 @@
                 <a:ea typeface="Tahoma" panose="020B0604030504040204" pitchFamily="34" charset="0"/>
                 <a:cs typeface="Tahoma" panose="020B0604030504040204" pitchFamily="34" charset="0"/>
               </a:rPr>
-              <a:t>CRUD Income (inside person detail page)</a:t>
+              <a:t>CRUD Income classification (inside person detail page)</a:t>
             </a:r>
             <a:endParaRPr lang="th-TH" dirty="0">
               <a:latin typeface="Tahoma" panose="020B0604030504040204" pitchFamily="34" charset="0"/>
@@ -5253,7 +5258,7 @@
                 <a:ea typeface="Tahoma" panose="020B0604030504040204" pitchFamily="34" charset="0"/>
                 <a:cs typeface="Tahoma" panose="020B0604030504040204" pitchFamily="34" charset="0"/>
               </a:rPr>
-              <a:t>CRUD Industry Type (inside organization detail page)</a:t>
+              <a:t>CRUD Industry classification   (inside organization detail page)</a:t>
             </a:r>
           </a:p>
           <a:p>
@@ -5268,7 +5273,7 @@
                 <a:ea typeface="Tahoma" panose="020B0604030504040204" pitchFamily="34" charset="0"/>
                 <a:cs typeface="Tahoma" panose="020B0604030504040204" pitchFamily="34" charset="0"/>
               </a:rPr>
-              <a:t>CRUD Size (inside organization detail page)</a:t>
+              <a:t>CRUD Size classification (inside organization detail page)</a:t>
             </a:r>
           </a:p>
           <a:p>
@@ -5283,7 +5288,7 @@
                 <a:ea typeface="Tahoma" panose="020B0604030504040204" pitchFamily="34" charset="0"/>
                 <a:cs typeface="Tahoma" panose="020B0604030504040204" pitchFamily="34" charset="0"/>
               </a:rPr>
-              <a:t>CRUD Minority (inside organization detail page)</a:t>
+              <a:t>CRUD Minority classification (inside organization detail page)</a:t>
             </a:r>
           </a:p>
         </p:txBody>

</xml_diff>

<commit_message>
presentation add ex about layer type and info
</commit_message>
<xml_diff>
--- a/presentation/partyCommFuncReqOverAll.pptx
+++ b/presentation/partyCommFuncReqOverAll.pptx
@@ -8,11 +8,12 @@
     <p:sldId id="256" r:id="rId2"/>
     <p:sldId id="257" r:id="rId3"/>
     <p:sldId id="258" r:id="rId4"/>
-    <p:sldId id="259" r:id="rId5"/>
-    <p:sldId id="263" r:id="rId6"/>
-    <p:sldId id="260" r:id="rId7"/>
-    <p:sldId id="261" r:id="rId8"/>
-    <p:sldId id="262" r:id="rId9"/>
+    <p:sldId id="264" r:id="rId5"/>
+    <p:sldId id="259" r:id="rId6"/>
+    <p:sldId id="263" r:id="rId7"/>
+    <p:sldId id="260" r:id="rId8"/>
+    <p:sldId id="261" r:id="rId9"/>
+    <p:sldId id="262" r:id="rId10"/>
   </p:sldIdLst>
   <p:sldSz cx="12192000" cy="6858000"/>
   <p:notesSz cx="6858000" cy="9144000"/>
@@ -268,7 +269,7 @@
           <a:p>
             <a:fld id="{C128FA71-3A18-48C0-980F-4B68F7F63042}" type="datetime1">
               <a:rPr lang="en-US" smtClean="0"/>
-              <a:t>6/25/2025</a:t>
+              <a:t>6/27/2025</a:t>
             </a:fld>
             <a:endParaRPr lang="en-US"/>
           </a:p>
@@ -468,7 +469,7 @@
           <a:p>
             <a:fld id="{7104EDB3-C0E8-45F8-9E1D-1B6C8D1880C0}" type="datetime1">
               <a:rPr lang="en-US" smtClean="0"/>
-              <a:t>6/25/2025</a:t>
+              <a:t>6/27/2025</a:t>
             </a:fld>
             <a:endParaRPr lang="en-US"/>
           </a:p>
@@ -678,7 +679,7 @@
           <a:p>
             <a:fld id="{9CF0EC4B-54ED-4041-B552-9BA760FA3DBA}" type="datetime1">
               <a:rPr lang="en-US" smtClean="0"/>
-              <a:t>6/25/2025</a:t>
+              <a:t>6/27/2025</a:t>
             </a:fld>
             <a:endParaRPr lang="en-US"/>
           </a:p>
@@ -878,7 +879,7 @@
           <a:p>
             <a:fld id="{51C1210E-201E-4473-82AC-2466F5386C38}" type="datetime1">
               <a:rPr lang="en-US" smtClean="0"/>
-              <a:t>6/25/2025</a:t>
+              <a:t>6/27/2025</a:t>
             </a:fld>
             <a:endParaRPr lang="en-US"/>
           </a:p>
@@ -1154,7 +1155,7 @@
           <a:p>
             <a:fld id="{B01EA198-6CAB-4B8F-B93F-1F9C8C4B6CE7}" type="datetime1">
               <a:rPr lang="en-US" smtClean="0"/>
-              <a:t>6/25/2025</a:t>
+              <a:t>6/27/2025</a:t>
             </a:fld>
             <a:endParaRPr lang="en-US"/>
           </a:p>
@@ -1422,7 +1423,7 @@
           <a:p>
             <a:fld id="{CA06041F-4525-44D5-AA4F-332294BF1F56}" type="datetime1">
               <a:rPr lang="en-US" smtClean="0"/>
-              <a:t>6/25/2025</a:t>
+              <a:t>6/27/2025</a:t>
             </a:fld>
             <a:endParaRPr lang="en-US"/>
           </a:p>
@@ -1837,7 +1838,7 @@
           <a:p>
             <a:fld id="{F9557091-BBDF-4EB9-BA6B-2BB67AC4FC0F}" type="datetime1">
               <a:rPr lang="en-US" smtClean="0"/>
-              <a:t>6/25/2025</a:t>
+              <a:t>6/27/2025</a:t>
             </a:fld>
             <a:endParaRPr lang="en-US"/>
           </a:p>
@@ -1979,7 +1980,7 @@
           <a:p>
             <a:fld id="{2D6B226B-77A6-410C-9796-083F278E0125}" type="datetime1">
               <a:rPr lang="en-US" smtClean="0"/>
-              <a:t>6/25/2025</a:t>
+              <a:t>6/27/2025</a:t>
             </a:fld>
             <a:endParaRPr lang="en-US"/>
           </a:p>
@@ -2092,7 +2093,7 @@
           <a:p>
             <a:fld id="{A23A578B-D289-4C40-8593-3D356C49DA58}" type="datetime1">
               <a:rPr lang="en-US" smtClean="0"/>
-              <a:t>6/25/2025</a:t>
+              <a:t>6/27/2025</a:t>
             </a:fld>
             <a:endParaRPr lang="en-US"/>
           </a:p>
@@ -2405,7 +2406,7 @@
           <a:p>
             <a:fld id="{713DFAE3-14DB-48A7-A80F-80DDB072CE3D}" type="datetime1">
               <a:rPr lang="en-US" smtClean="0"/>
-              <a:t>6/25/2025</a:t>
+              <a:t>6/27/2025</a:t>
             </a:fld>
             <a:endParaRPr lang="en-US"/>
           </a:p>
@@ -2694,7 +2695,7 @@
           <a:p>
             <a:fld id="{92C5EAEF-6478-4102-8F5D-A5FE9FC97ACB}" type="datetime1">
               <a:rPr lang="en-US" smtClean="0"/>
-              <a:t>6/25/2025</a:t>
+              <a:t>6/27/2025</a:t>
             </a:fld>
             <a:endParaRPr lang="en-US"/>
           </a:p>
@@ -2937,7 +2938,7 @@
           <a:p>
             <a:fld id="{67F45AC6-C491-4585-A584-9CE2AF7D5500}" type="datetime1">
               <a:rPr lang="en-US" smtClean="0"/>
-              <a:t>6/25/2025</a:t>
+              <a:t>6/27/2025</a:t>
             </a:fld>
             <a:endParaRPr lang="en-US"/>
           </a:p>
@@ -4353,7 +4354,9 @@
         </p:nvSpPr>
         <p:spPr/>
         <p:txBody>
-          <a:bodyPr/>
+          <a:bodyPr>
+            <a:normAutofit/>
+          </a:bodyPr>
           <a:lstStyle/>
           <a:p>
             <a:pPr>
@@ -4383,7 +4386,7 @@
                 <a:ea typeface="Tahoma" panose="020B0604030504040204" pitchFamily="34" charset="0"/>
                 <a:cs typeface="Tahoma" panose="020B0604030504040204" pitchFamily="34" charset="0"/>
               </a:rPr>
-              <a:t>layer </a:t>
+              <a:t>layer</a:t>
             </a:r>
             <a:r>
               <a:rPr lang="th-TH" dirty="0">
@@ -4391,7 +4394,7 @@
                 <a:ea typeface="Tahoma" panose="020B0604030504040204" pitchFamily="34" charset="0"/>
                 <a:cs typeface="Tahoma" panose="020B0604030504040204" pitchFamily="34" charset="0"/>
               </a:rPr>
-              <a:t>ที่น่าจะไม่ได้ยุ่งกับมัน แค่ทำเผื่อไว้</a:t>
+              <a:t> ฐานระบบที่ไม่มีการแก้ไขออกแบบเพื่อรองรับการขยายในอนาคต</a:t>
             </a:r>
           </a:p>
           <a:p>
@@ -4422,7 +4425,7 @@
                 <a:ea typeface="Tahoma" panose="020B0604030504040204" pitchFamily="34" charset="0"/>
                 <a:cs typeface="Tahoma" panose="020B0604030504040204" pitchFamily="34" charset="0"/>
               </a:rPr>
-              <a:t>layer </a:t>
+              <a:t>layer</a:t>
             </a:r>
             <a:r>
               <a:rPr lang="th-TH" dirty="0">
@@ -4430,7 +4433,7 @@
                 <a:ea typeface="Tahoma" panose="020B0604030504040204" pitchFamily="34" charset="0"/>
                 <a:cs typeface="Tahoma" panose="020B0604030504040204" pitchFamily="34" charset="0"/>
               </a:rPr>
-              <a:t>ที่ทำแล้วเอาไว้ใช้ใน </a:t>
+              <a:t> กำหนดประเภทข้อมูล ส่งต่อให้ </a:t>
             </a:r>
             <a:r>
               <a:rPr lang="en-US" dirty="0">
@@ -4438,7 +4441,7 @@
                 <a:ea typeface="Tahoma" panose="020B0604030504040204" pitchFamily="34" charset="0"/>
                 <a:cs typeface="Tahoma" panose="020B0604030504040204" pitchFamily="34" charset="0"/>
               </a:rPr>
-              <a:t>layer info </a:t>
+              <a:t>Layer </a:t>
             </a:r>
             <a:r>
               <a:rPr lang="th-TH" dirty="0">
@@ -4446,7 +4449,7 @@
                 <a:ea typeface="Tahoma" panose="020B0604030504040204" pitchFamily="34" charset="0"/>
                 <a:cs typeface="Tahoma" panose="020B0604030504040204" pitchFamily="34" charset="0"/>
               </a:rPr>
-              <a:t>ต่อไป</a:t>
+              <a:t>ถัดไปใช้งาน</a:t>
             </a:r>
           </a:p>
           <a:p>
@@ -4485,7 +4488,7 @@
                 <a:ea typeface="Tahoma" panose="020B0604030504040204" pitchFamily="34" charset="0"/>
                 <a:cs typeface="Tahoma" panose="020B0604030504040204" pitchFamily="34" charset="0"/>
               </a:rPr>
-              <a:t>ที่เก็บรายละเอียดของ </a:t>
+              <a:t>เก็บรายละเอียดของ </a:t>
             </a:r>
             <a:r>
               <a:rPr lang="en-US" dirty="0">
@@ -4501,7 +4504,7 @@
                 <a:ea typeface="Tahoma" panose="020B0604030504040204" pitchFamily="34" charset="0"/>
                 <a:cs typeface="Tahoma" panose="020B0604030504040204" pitchFamily="34" charset="0"/>
               </a:rPr>
-              <a:t>คือบุคคล และองค์กรณ์)</a:t>
+              <a:t>บุคคลและองค์กรณ์)</a:t>
             </a:r>
           </a:p>
           <a:p>
@@ -4540,23 +4543,7 @@
                 <a:ea typeface="Tahoma" panose="020B0604030504040204" pitchFamily="34" charset="0"/>
                 <a:cs typeface="Tahoma" panose="020B0604030504040204" pitchFamily="34" charset="0"/>
               </a:rPr>
-              <a:t>ที่เก็บความสำพันธ์ของ </a:t>
-            </a:r>
-            <a:r>
-              <a:rPr lang="en-US" dirty="0">
-                <a:latin typeface="Tahoma" panose="020B0604030504040204" pitchFamily="34" charset="0"/>
-                <a:ea typeface="Tahoma" panose="020B0604030504040204" pitchFamily="34" charset="0"/>
-                <a:cs typeface="Tahoma" panose="020B0604030504040204" pitchFamily="34" charset="0"/>
-              </a:rPr>
-              <a:t>Party </a:t>
-            </a:r>
-            <a:r>
-              <a:rPr lang="th-TH" dirty="0">
-                <a:latin typeface="Tahoma" panose="020B0604030504040204" pitchFamily="34" charset="0"/>
-                <a:ea typeface="Tahoma" panose="020B0604030504040204" pitchFamily="34" charset="0"/>
-                <a:cs typeface="Tahoma" panose="020B0604030504040204" pitchFamily="34" charset="0"/>
-              </a:rPr>
-              <a:t>กับ </a:t>
+              <a:t>บันทึกความสัมพันธ์ระหว่าง </a:t>
             </a:r>
             <a:r>
               <a:rPr lang="en-US" dirty="0">
@@ -4608,7 +4595,7 @@
                 <a:ea typeface="Tahoma" panose="020B0604030504040204" pitchFamily="34" charset="0"/>
                 <a:cs typeface="Tahoma" panose="020B0604030504040204" pitchFamily="34" charset="0"/>
               </a:rPr>
-              <a:t>ที่เก็บรายละเอียดการติดต่อของแต่ละความสำพันธ์</a:t>
+              <a:t>เก็บรายละเอียดการติดต่อของแต่ละความสำพันธ์</a:t>
             </a:r>
             <a:endParaRPr lang="en-US" dirty="0">
               <a:latin typeface="Tahoma" panose="020B0604030504040204" pitchFamily="34" charset="0"/>
@@ -4738,6 +4725,14 @@
 <file path=ppt/slides/slide4.xml><?xml version="1.0" encoding="utf-8"?>
 <p:sld xmlns:a="http://schemas.openxmlformats.org/drawingml/2006/main" xmlns:r="http://schemas.openxmlformats.org/officeDocument/2006/relationships" xmlns:p="http://schemas.openxmlformats.org/presentationml/2006/main">
   <p:cSld>
+    <p:bg>
+      <p:bgPr>
+        <a:solidFill>
+          <a:schemeClr val="bg1"/>
+        </a:solidFill>
+        <a:effectLst/>
+      </p:bgPr>
+    </p:bg>
     <p:spTree>
       <p:nvGrpSpPr>
         <p:cNvPr id="1" name=""/>
@@ -4754,10 +4749,73 @@
       </p:grpSpPr>
       <p:sp>
         <p:nvSpPr>
+          <p:cNvPr id="10" name="Rectangle 9">
+            <a:extLst>
+              <a:ext uri="{FF2B5EF4-FFF2-40B4-BE49-F238E27FC236}">
+                <a16:creationId xmlns:a16="http://schemas.microsoft.com/office/drawing/2014/main" id="{A4AC5506-6312-4701-8D3C-40187889A947}"/>
+              </a:ext>
+              <a:ext uri="{C183D7F6-B498-43B3-948B-1728B52AA6E4}">
+                <adec:decorative xmlns:adec="http://schemas.microsoft.com/office/drawing/2017/decorative" val="1"/>
+              </a:ext>
+            </a:extLst>
+          </p:cNvPr>
+          <p:cNvSpPr>
+            <a:spLocks noGrp="1" noRot="1" noChangeAspect="1" noMove="1" noResize="1" noEditPoints="1" noAdjustHandles="1" noChangeArrowheads="1" noChangeShapeType="1" noTextEdit="1"/>
+          </p:cNvSpPr>
+          <p:nvPr>
+            <p:extLst>
+              <p:ext uri="{386F3935-93C4-4BCD-93E2-E3B085C9AB24}">
+                <p16:designElem xmlns:p16="http://schemas.microsoft.com/office/powerpoint/2015/main" val="1"/>
+              </p:ext>
+            </p:extLst>
+          </p:nvPr>
+        </p:nvSpPr>
+        <p:spPr>
+          <a:xfrm>
+            <a:off x="0" y="651752"/>
+            <a:ext cx="12192000" cy="736551"/>
+          </a:xfrm>
+          <a:prstGeom prst="rect">
+            <a:avLst/>
+          </a:prstGeom>
+          <a:solidFill>
+            <a:schemeClr val="tx1"/>
+          </a:solidFill>
+          <a:ln>
+            <a:noFill/>
+          </a:ln>
+        </p:spPr>
+        <p:style>
+          <a:lnRef idx="2">
+            <a:schemeClr val="accent1">
+              <a:shade val="50000"/>
+            </a:schemeClr>
+          </a:lnRef>
+          <a:fillRef idx="1">
+            <a:schemeClr val="accent1"/>
+          </a:fillRef>
+          <a:effectRef idx="0">
+            <a:schemeClr val="accent1"/>
+          </a:effectRef>
+          <a:fontRef idx="minor">
+            <a:schemeClr val="lt1"/>
+          </a:fontRef>
+        </p:style>
+        <p:txBody>
+          <a:bodyPr rtlCol="0" anchor="ctr"/>
+          <a:lstStyle/>
+          <a:p>
+            <a:pPr algn="ctr"/>
+            <a:endParaRPr lang="en-US"/>
+          </a:p>
+        </p:txBody>
+      </p:sp>
+      <p:sp>
+        <p:nvSpPr>
           <p:cNvPr id="2" name="Title 1">
             <a:extLst>
               <a:ext uri="{FF2B5EF4-FFF2-40B4-BE49-F238E27FC236}">
-                <a16:creationId xmlns:a16="http://schemas.microsoft.com/office/drawing/2014/main" id="{334646AC-5199-321D-B74E-177052F23AFD}"/>
+                <a16:creationId xmlns:a16="http://schemas.microsoft.com/office/drawing/2014/main" id="{55E11298-47D2-589F-B021-B924016A5683}"/>
               </a:ext>
             </a:extLst>
           </p:cNvPr>
@@ -4768,145 +4826,108 @@
             <p:ph type="title"/>
           </p:nvPr>
         </p:nvSpPr>
-        <p:spPr/>
-        <p:txBody>
-          <a:bodyPr/>
-          <a:lstStyle/>
-          <a:p>
-            <a:r>
-              <a:rPr lang="en-US" dirty="0">
+        <p:spPr>
+          <a:xfrm>
+            <a:off x="556532" y="643467"/>
+            <a:ext cx="11210925" cy="744836"/>
+          </a:xfrm>
+        </p:spPr>
+        <p:txBody>
+          <a:bodyPr vert="horz" lIns="91440" tIns="45720" rIns="91440" bIns="45720" rtlCol="0" anchor="ctr">
+            <a:normAutofit/>
+          </a:bodyPr>
+          <a:lstStyle/>
+          <a:p>
+            <a:pPr algn="ctr"/>
+            <a:r>
+              <a:rPr lang="en-US" sz="3200" kern="1200" dirty="0" err="1">
+                <a:solidFill>
+                  <a:schemeClr val="bg1"/>
+                </a:solidFill>
                 <a:latin typeface="Tahoma" panose="020B0604030504040204" pitchFamily="34" charset="0"/>
                 <a:ea typeface="Tahoma" panose="020B0604030504040204" pitchFamily="34" charset="0"/>
                 <a:cs typeface="Tahoma" panose="020B0604030504040204" pitchFamily="34" charset="0"/>
               </a:rPr>
-              <a:t>Type Layer (for party)</a:t>
-            </a:r>
-            <a:endParaRPr lang="th-TH" dirty="0">
-              <a:latin typeface="Tahoma" panose="020B0604030504040204" pitchFamily="34" charset="0"/>
-              <a:ea typeface="Tahoma" panose="020B0604030504040204" pitchFamily="34" charset="0"/>
-              <a:cs typeface="Tahoma" panose="020B0604030504040204" pitchFamily="34" charset="0"/>
-            </a:endParaRPr>
-          </a:p>
-        </p:txBody>
-      </p:sp>
-      <p:sp>
-        <p:nvSpPr>
-          <p:cNvPr id="3" name="Content Placeholder 2">
-            <a:extLst>
-              <a:ext uri="{FF2B5EF4-FFF2-40B4-BE49-F238E27FC236}">
-                <a16:creationId xmlns:a16="http://schemas.microsoft.com/office/drawing/2014/main" id="{FD20E76C-C78D-059D-DFE2-EA0ED97C5249}"/>
-              </a:ext>
-            </a:extLst>
-          </p:cNvPr>
-          <p:cNvSpPr>
-            <a:spLocks noGrp="1"/>
-          </p:cNvSpPr>
-          <p:nvPr>
-            <p:ph idx="1"/>
-          </p:nvPr>
-        </p:nvSpPr>
-        <p:spPr/>
-        <p:txBody>
-          <a:bodyPr>
-            <a:normAutofit lnSpcReduction="10000"/>
-          </a:bodyPr>
-          <a:lstStyle/>
-          <a:p>
-            <a:r>
-              <a:rPr lang="en-US" dirty="0">
+              <a:t>ตัวอย่างการออกแบบ</a:t>
+            </a:r>
+            <a:r>
+              <a:rPr lang="en-US" sz="3200" kern="1200" dirty="0">
+                <a:solidFill>
+                  <a:schemeClr val="bg1"/>
+                </a:solidFill>
                 <a:latin typeface="Tahoma" panose="020B0604030504040204" pitchFamily="34" charset="0"/>
                 <a:ea typeface="Tahoma" panose="020B0604030504040204" pitchFamily="34" charset="0"/>
                 <a:cs typeface="Tahoma" panose="020B0604030504040204" pitchFamily="34" charset="0"/>
               </a:rPr>
-              <a:t>CRUD Marital Status Type</a:t>
-            </a:r>
-          </a:p>
-          <a:p>
-            <a:r>
-              <a:rPr lang="en-US" dirty="0">
+              <a:t> layer type </a:t>
+            </a:r>
+            <a:r>
+              <a:rPr lang="en-US" sz="3200" kern="1200" dirty="0" err="1">
+                <a:solidFill>
+                  <a:schemeClr val="bg1"/>
+                </a:solidFill>
                 <a:latin typeface="Tahoma" panose="020B0604030504040204" pitchFamily="34" charset="0"/>
                 <a:ea typeface="Tahoma" panose="020B0604030504040204" pitchFamily="34" charset="0"/>
                 <a:cs typeface="Tahoma" panose="020B0604030504040204" pitchFamily="34" charset="0"/>
               </a:rPr>
-              <a:t>CRUD Person Name Type</a:t>
-            </a:r>
-          </a:p>
-          <a:p>
-            <a:r>
-              <a:rPr lang="en-US" dirty="0">
+              <a:t>และ</a:t>
+            </a:r>
+            <a:r>
+              <a:rPr lang="en-US" sz="3200" kern="1200" dirty="0">
+                <a:solidFill>
+                  <a:schemeClr val="bg1"/>
+                </a:solidFill>
                 <a:latin typeface="Tahoma" panose="020B0604030504040204" pitchFamily="34" charset="0"/>
                 <a:ea typeface="Tahoma" panose="020B0604030504040204" pitchFamily="34" charset="0"/>
                 <a:cs typeface="Tahoma" panose="020B0604030504040204" pitchFamily="34" charset="0"/>
               </a:rPr>
-              <a:t>CRUD Physical Characteristic Type</a:t>
-            </a:r>
-          </a:p>
-          <a:p>
-            <a:r>
-              <a:rPr lang="en-US" dirty="0">
-                <a:latin typeface="Tahoma" panose="020B0604030504040204" pitchFamily="34" charset="0"/>
-                <a:ea typeface="Tahoma" panose="020B0604030504040204" pitchFamily="34" charset="0"/>
-                <a:cs typeface="Tahoma" panose="020B0604030504040204" pitchFamily="34" charset="0"/>
-              </a:rPr>
-              <a:t>CRUD Gender Type</a:t>
-            </a:r>
-          </a:p>
-          <a:p>
-            <a:r>
-              <a:rPr lang="en-US" dirty="0">
-                <a:latin typeface="Tahoma" panose="020B0604030504040204" pitchFamily="34" charset="0"/>
-                <a:ea typeface="Tahoma" panose="020B0604030504040204" pitchFamily="34" charset="0"/>
-                <a:cs typeface="Tahoma" panose="020B0604030504040204" pitchFamily="34" charset="0"/>
-              </a:rPr>
-              <a:t>CRUD Ethnicity</a:t>
-            </a:r>
-          </a:p>
-          <a:p>
-            <a:r>
-              <a:rPr lang="en-US" dirty="0">
-                <a:latin typeface="Tahoma" panose="020B0604030504040204" pitchFamily="34" charset="0"/>
-                <a:ea typeface="Tahoma" panose="020B0604030504040204" pitchFamily="34" charset="0"/>
-                <a:cs typeface="Tahoma" panose="020B0604030504040204" pitchFamily="34" charset="0"/>
-              </a:rPr>
-              <a:t>CRUD Income Range</a:t>
-            </a:r>
-          </a:p>
-          <a:p>
-            <a:r>
-              <a:rPr lang="en-US" dirty="0">
-                <a:latin typeface="Tahoma" panose="020B0604030504040204" pitchFamily="34" charset="0"/>
-                <a:ea typeface="Tahoma" panose="020B0604030504040204" pitchFamily="34" charset="0"/>
-                <a:cs typeface="Tahoma" panose="020B0604030504040204" pitchFamily="34" charset="0"/>
-              </a:rPr>
-              <a:t>CRUD Industry Type</a:t>
-            </a:r>
-          </a:p>
-          <a:p>
-            <a:r>
-              <a:rPr lang="en-US" dirty="0">
-                <a:latin typeface="Tahoma" panose="020B0604030504040204" pitchFamily="34" charset="0"/>
-                <a:ea typeface="Tahoma" panose="020B0604030504040204" pitchFamily="34" charset="0"/>
-                <a:cs typeface="Tahoma" panose="020B0604030504040204" pitchFamily="34" charset="0"/>
-              </a:rPr>
-              <a:t>CRUD Employee Count range</a:t>
-            </a:r>
-          </a:p>
-          <a:p>
-            <a:r>
-              <a:rPr lang="en-US" dirty="0">
-                <a:latin typeface="Tahoma" panose="020B0604030504040204" pitchFamily="34" charset="0"/>
-                <a:ea typeface="Tahoma" panose="020B0604030504040204" pitchFamily="34" charset="0"/>
-                <a:cs typeface="Tahoma" panose="020B0604030504040204" pitchFamily="34" charset="0"/>
-              </a:rPr>
-              <a:t>CRUD Minority Type</a:t>
-            </a:r>
-          </a:p>
-        </p:txBody>
-      </p:sp>
+              <a:t> info</a:t>
+            </a:r>
+          </a:p>
+        </p:txBody>
+      </p:sp>
+      <p:pic>
+        <p:nvPicPr>
+          <p:cNvPr id="5" name="Content Placeholder 4" descr="A diagram of a type of status&#10;&#10;AI-generated content may be incorrect.">
+            <a:extLst>
+              <a:ext uri="{FF2B5EF4-FFF2-40B4-BE49-F238E27FC236}">
+                <a16:creationId xmlns:a16="http://schemas.microsoft.com/office/drawing/2014/main" id="{21C4F74B-5FA6-24F4-CC01-2B6F23E0F9CD}"/>
+              </a:ext>
+            </a:extLst>
+          </p:cNvPr>
+          <p:cNvPicPr>
+            <a:picLocks noGrp="1" noChangeAspect="1"/>
+          </p:cNvPicPr>
+          <p:nvPr>
+            <p:ph idx="1"/>
+          </p:nvPr>
+        </p:nvPicPr>
+        <p:blipFill>
+          <a:blip r:embed="rId2">
+            <a:extLst>
+              <a:ext uri="{28A0092B-C50C-407E-A947-70E740481C1C}">
+                <a14:useLocalDpi xmlns:a14="http://schemas.microsoft.com/office/drawing/2010/main" val="0"/>
+              </a:ext>
+            </a:extLst>
+          </a:blip>
+          <a:stretch>
+            <a:fillRect/>
+          </a:stretch>
+        </p:blipFill>
+        <p:spPr>
+          <a:xfrm>
+            <a:off x="1766740" y="1675227"/>
+            <a:ext cx="8658520" cy="4394199"/>
+          </a:xfrm>
+          <a:prstGeom prst="rect">
+            <a:avLst/>
+          </a:prstGeom>
+        </p:spPr>
+      </p:pic>
     </p:spTree>
     <p:extLst>
       <p:ext uri="{BB962C8B-B14F-4D97-AF65-F5344CB8AC3E}">
-        <p14:creationId xmlns:p14="http://schemas.microsoft.com/office/powerpoint/2010/main" val="2691903521"/>
+        <p14:creationId xmlns:p14="http://schemas.microsoft.com/office/powerpoint/2010/main" val="1851336316"/>
       </p:ext>
     </p:extLst>
   </p:cSld>
@@ -4938,7 +4959,7 @@
           <p:cNvPr id="2" name="Title 1">
             <a:extLst>
               <a:ext uri="{FF2B5EF4-FFF2-40B4-BE49-F238E27FC236}">
-                <a16:creationId xmlns:a16="http://schemas.microsoft.com/office/drawing/2014/main" id="{8F8D4729-9762-5314-E3A3-E84436F5957D}"/>
+                <a16:creationId xmlns:a16="http://schemas.microsoft.com/office/drawing/2014/main" id="{334646AC-5199-321D-B74E-177052F23AFD}"/>
               </a:ext>
             </a:extLst>
           </p:cNvPr>
@@ -4955,10 +4976,18 @@
           <a:lstStyle/>
           <a:p>
             <a:r>
-              <a:rPr lang="en-US" dirty="0"/>
-              <a:t>Layer Type (for relation and communication)</a:t>
-            </a:r>
-            <a:endParaRPr lang="th-TH" dirty="0"/>
+              <a:rPr lang="en-US" dirty="0">
+                <a:latin typeface="Tahoma" panose="020B0604030504040204" pitchFamily="34" charset="0"/>
+                <a:ea typeface="Tahoma" panose="020B0604030504040204" pitchFamily="34" charset="0"/>
+                <a:cs typeface="Tahoma" panose="020B0604030504040204" pitchFamily="34" charset="0"/>
+              </a:rPr>
+              <a:t>Type Layer (for party)</a:t>
+            </a:r>
+            <a:endParaRPr lang="th-TH" dirty="0">
+              <a:latin typeface="Tahoma" panose="020B0604030504040204" pitchFamily="34" charset="0"/>
+              <a:ea typeface="Tahoma" panose="020B0604030504040204" pitchFamily="34" charset="0"/>
+              <a:cs typeface="Tahoma" panose="020B0604030504040204" pitchFamily="34" charset="0"/>
+            </a:endParaRPr>
           </a:p>
         </p:txBody>
       </p:sp>
@@ -4967,7 +4996,7 @@
           <p:cNvPr id="3" name="Content Placeholder 2">
             <a:extLst>
               <a:ext uri="{FF2B5EF4-FFF2-40B4-BE49-F238E27FC236}">
-                <a16:creationId xmlns:a16="http://schemas.microsoft.com/office/drawing/2014/main" id="{DE8016BC-9821-9976-0548-23EE1CC03E4A}"/>
+                <a16:creationId xmlns:a16="http://schemas.microsoft.com/office/drawing/2014/main" id="{FD20E76C-C78D-059D-DFE2-EA0ED97C5249}"/>
               </a:ext>
             </a:extLst>
           </p:cNvPr>
@@ -4980,92 +5009,106 @@
         </p:nvSpPr>
         <p:spPr/>
         <p:txBody>
-          <a:bodyPr/>
-          <a:lstStyle/>
-          <a:p>
-            <a:pPr>
-              <a:spcBef>
-                <a:spcPts val="1800"/>
-              </a:spcBef>
-            </a:pPr>
-            <a:r>
-              <a:rPr lang="en-US" dirty="0"/>
-              <a:t>CRUD Role Type</a:t>
-            </a:r>
-          </a:p>
-          <a:p>
-            <a:pPr>
-              <a:spcBef>
-                <a:spcPts val="1800"/>
-              </a:spcBef>
-            </a:pPr>
-            <a:r>
-              <a:rPr lang="en-US" dirty="0"/>
-              <a:t>CRUD Party Relationship Type</a:t>
-            </a:r>
-          </a:p>
-          <a:p>
-            <a:pPr>
-              <a:spcBef>
-                <a:spcPts val="1800"/>
-              </a:spcBef>
-            </a:pPr>
-            <a:r>
-              <a:rPr lang="en-US" dirty="0"/>
-              <a:t>CRUD Party Relationship Status Type</a:t>
-            </a:r>
-          </a:p>
-          <a:p>
-            <a:pPr>
-              <a:spcBef>
-                <a:spcPts val="1800"/>
-              </a:spcBef>
-            </a:pPr>
-            <a:r>
-              <a:rPr lang="en-US" dirty="0"/>
-              <a:t>CRUD Priority Type </a:t>
-            </a:r>
-          </a:p>
-          <a:p>
-            <a:pPr>
-              <a:spcBef>
-                <a:spcPts val="1800"/>
-              </a:spcBef>
-            </a:pPr>
-            <a:r>
-              <a:rPr lang="en-US" dirty="0"/>
-              <a:t>CRUD Communication Event Status Type</a:t>
-            </a:r>
-          </a:p>
-          <a:p>
-            <a:pPr>
-              <a:spcBef>
-                <a:spcPts val="1800"/>
-              </a:spcBef>
-            </a:pPr>
-            <a:r>
-              <a:rPr lang="en-US" dirty="0"/>
-              <a:t>CRUD Contact Mechanism Type</a:t>
-            </a:r>
-          </a:p>
-          <a:p>
-            <a:pPr>
-              <a:spcBef>
-                <a:spcPts val="1800"/>
-              </a:spcBef>
-            </a:pPr>
-            <a:r>
-              <a:rPr lang="en-US" dirty="0"/>
-              <a:t>CRUD Communication Event Purpose Type </a:t>
-            </a:r>
-            <a:endParaRPr lang="th-TH" dirty="0"/>
+          <a:bodyPr>
+            <a:normAutofit lnSpcReduction="10000"/>
+          </a:bodyPr>
+          <a:lstStyle/>
+          <a:p>
+            <a:r>
+              <a:rPr lang="en-US" dirty="0">
+                <a:latin typeface="Tahoma" panose="020B0604030504040204" pitchFamily="34" charset="0"/>
+                <a:ea typeface="Tahoma" panose="020B0604030504040204" pitchFamily="34" charset="0"/>
+                <a:cs typeface="Tahoma" panose="020B0604030504040204" pitchFamily="34" charset="0"/>
+              </a:rPr>
+              <a:t>CRUD Marital Status Type</a:t>
+            </a:r>
+          </a:p>
+          <a:p>
+            <a:r>
+              <a:rPr lang="en-US" dirty="0">
+                <a:latin typeface="Tahoma" panose="020B0604030504040204" pitchFamily="34" charset="0"/>
+                <a:ea typeface="Tahoma" panose="020B0604030504040204" pitchFamily="34" charset="0"/>
+                <a:cs typeface="Tahoma" panose="020B0604030504040204" pitchFamily="34" charset="0"/>
+              </a:rPr>
+              <a:t>CRUD Person Name Type</a:t>
+            </a:r>
+          </a:p>
+          <a:p>
+            <a:r>
+              <a:rPr lang="en-US" dirty="0">
+                <a:latin typeface="Tahoma" panose="020B0604030504040204" pitchFamily="34" charset="0"/>
+                <a:ea typeface="Tahoma" panose="020B0604030504040204" pitchFamily="34" charset="0"/>
+                <a:cs typeface="Tahoma" panose="020B0604030504040204" pitchFamily="34" charset="0"/>
+              </a:rPr>
+              <a:t>CRUD Physical Characteristic Type</a:t>
+            </a:r>
+          </a:p>
+          <a:p>
+            <a:r>
+              <a:rPr lang="en-US" dirty="0">
+                <a:latin typeface="Tahoma" panose="020B0604030504040204" pitchFamily="34" charset="0"/>
+                <a:ea typeface="Tahoma" panose="020B0604030504040204" pitchFamily="34" charset="0"/>
+                <a:cs typeface="Tahoma" panose="020B0604030504040204" pitchFamily="34" charset="0"/>
+              </a:rPr>
+              <a:t>CRUD Gender Type</a:t>
+            </a:r>
+          </a:p>
+          <a:p>
+            <a:r>
+              <a:rPr lang="en-US" dirty="0">
+                <a:latin typeface="Tahoma" panose="020B0604030504040204" pitchFamily="34" charset="0"/>
+                <a:ea typeface="Tahoma" panose="020B0604030504040204" pitchFamily="34" charset="0"/>
+                <a:cs typeface="Tahoma" panose="020B0604030504040204" pitchFamily="34" charset="0"/>
+              </a:rPr>
+              <a:t>CRUD Ethnicity</a:t>
+            </a:r>
+          </a:p>
+          <a:p>
+            <a:r>
+              <a:rPr lang="en-US" dirty="0">
+                <a:latin typeface="Tahoma" panose="020B0604030504040204" pitchFamily="34" charset="0"/>
+                <a:ea typeface="Tahoma" panose="020B0604030504040204" pitchFamily="34" charset="0"/>
+                <a:cs typeface="Tahoma" panose="020B0604030504040204" pitchFamily="34" charset="0"/>
+              </a:rPr>
+              <a:t>CRUD Income Range</a:t>
+            </a:r>
+          </a:p>
+          <a:p>
+            <a:r>
+              <a:rPr lang="en-US" dirty="0">
+                <a:latin typeface="Tahoma" panose="020B0604030504040204" pitchFamily="34" charset="0"/>
+                <a:ea typeface="Tahoma" panose="020B0604030504040204" pitchFamily="34" charset="0"/>
+                <a:cs typeface="Tahoma" panose="020B0604030504040204" pitchFamily="34" charset="0"/>
+              </a:rPr>
+              <a:t>CRUD Industry Type</a:t>
+            </a:r>
+          </a:p>
+          <a:p>
+            <a:r>
+              <a:rPr lang="en-US" dirty="0">
+                <a:latin typeface="Tahoma" panose="020B0604030504040204" pitchFamily="34" charset="0"/>
+                <a:ea typeface="Tahoma" panose="020B0604030504040204" pitchFamily="34" charset="0"/>
+                <a:cs typeface="Tahoma" panose="020B0604030504040204" pitchFamily="34" charset="0"/>
+              </a:rPr>
+              <a:t>CRUD Employee Count range</a:t>
+            </a:r>
+          </a:p>
+          <a:p>
+            <a:r>
+              <a:rPr lang="en-US" dirty="0">
+                <a:latin typeface="Tahoma" panose="020B0604030504040204" pitchFamily="34" charset="0"/>
+                <a:ea typeface="Tahoma" panose="020B0604030504040204" pitchFamily="34" charset="0"/>
+                <a:cs typeface="Tahoma" panose="020B0604030504040204" pitchFamily="34" charset="0"/>
+              </a:rPr>
+              <a:t>CRUD Minority Type</a:t>
+            </a:r>
           </a:p>
         </p:txBody>
       </p:sp>
     </p:spTree>
     <p:extLst>
       <p:ext uri="{BB962C8B-B14F-4D97-AF65-F5344CB8AC3E}">
-        <p14:creationId xmlns:p14="http://schemas.microsoft.com/office/powerpoint/2010/main" val="4069295476"/>
+        <p14:creationId xmlns:p14="http://schemas.microsoft.com/office/powerpoint/2010/main" val="2691903521"/>
       </p:ext>
     </p:extLst>
   </p:cSld>
@@ -5097,7 +5140,7 @@
           <p:cNvPr id="2" name="Title 1">
             <a:extLst>
               <a:ext uri="{FF2B5EF4-FFF2-40B4-BE49-F238E27FC236}">
-                <a16:creationId xmlns:a16="http://schemas.microsoft.com/office/drawing/2014/main" id="{74D28A83-C5C3-E4DD-BF35-31E41D4EFEBD}"/>
+                <a16:creationId xmlns:a16="http://schemas.microsoft.com/office/drawing/2014/main" id="{8F8D4729-9762-5314-E3A3-E84436F5957D}"/>
               </a:ext>
             </a:extLst>
           </p:cNvPr>
@@ -5114,18 +5157,10 @@
           <a:lstStyle/>
           <a:p>
             <a:r>
-              <a:rPr lang="en-US" dirty="0">
-                <a:latin typeface="Tahoma" panose="020B0604030504040204" pitchFamily="34" charset="0"/>
-                <a:ea typeface="Tahoma" panose="020B0604030504040204" pitchFamily="34" charset="0"/>
-                <a:cs typeface="Tahoma" panose="020B0604030504040204" pitchFamily="34" charset="0"/>
-              </a:rPr>
-              <a:t>Info Layer</a:t>
-            </a:r>
-            <a:endParaRPr lang="th-TH" dirty="0">
-              <a:latin typeface="Tahoma" panose="020B0604030504040204" pitchFamily="34" charset="0"/>
-              <a:ea typeface="Tahoma" panose="020B0604030504040204" pitchFamily="34" charset="0"/>
-              <a:cs typeface="Tahoma" panose="020B0604030504040204" pitchFamily="34" charset="0"/>
-            </a:endParaRPr>
+              <a:rPr lang="en-US" dirty="0"/>
+              <a:t>Layer Type (for relation and communication)</a:t>
+            </a:r>
+            <a:endParaRPr lang="th-TH" dirty="0"/>
           </a:p>
         </p:txBody>
       </p:sp>
@@ -5134,7 +5169,7 @@
           <p:cNvPr id="3" name="Content Placeholder 2">
             <a:extLst>
               <a:ext uri="{FF2B5EF4-FFF2-40B4-BE49-F238E27FC236}">
-                <a16:creationId xmlns:a16="http://schemas.microsoft.com/office/drawing/2014/main" id="{9A438D87-5470-28F1-F584-4BDBDDC7B9D7}"/>
+                <a16:creationId xmlns:a16="http://schemas.microsoft.com/office/drawing/2014/main" id="{DE8016BC-9821-9976-0548-23EE1CC03E4A}"/>
               </a:ext>
             </a:extLst>
           </p:cNvPr>
@@ -5147,9 +5182,7 @@
         </p:nvSpPr>
         <p:spPr/>
         <p:txBody>
-          <a:bodyPr>
-            <a:normAutofit fontScale="92500" lnSpcReduction="20000"/>
-          </a:bodyPr>
+          <a:bodyPr/>
           <a:lstStyle/>
           <a:p>
             <a:pPr>
@@ -5158,12 +5191,8 @@
               </a:spcBef>
             </a:pPr>
             <a:r>
-              <a:rPr lang="en-US" dirty="0">
-                <a:latin typeface="Tahoma" panose="020B0604030504040204" pitchFamily="34" charset="0"/>
-                <a:ea typeface="Tahoma" panose="020B0604030504040204" pitchFamily="34" charset="0"/>
-                <a:cs typeface="Tahoma" panose="020B0604030504040204" pitchFamily="34" charset="0"/>
-              </a:rPr>
-              <a:t>CRUD Person</a:t>
+              <a:rPr lang="en-US" dirty="0"/>
+              <a:t>CRUD Role Type</a:t>
             </a:r>
           </a:p>
           <a:p>
@@ -5173,27 +5202,8 @@
               </a:spcBef>
             </a:pPr>
             <a:r>
-              <a:rPr lang="en-US" dirty="0">
-                <a:latin typeface="Tahoma" panose="020B0604030504040204" pitchFamily="34" charset="0"/>
-                <a:ea typeface="Tahoma" panose="020B0604030504040204" pitchFamily="34" charset="0"/>
-                <a:cs typeface="Tahoma" panose="020B0604030504040204" pitchFamily="34" charset="0"/>
-              </a:rPr>
-              <a:t>CRUD Passport (inside person detail page) </a:t>
-            </a:r>
-            <a:br>
-              <a:rPr lang="en-US" dirty="0">
-                <a:latin typeface="Tahoma" panose="020B0604030504040204" pitchFamily="34" charset="0"/>
-                <a:ea typeface="Tahoma" panose="020B0604030504040204" pitchFamily="34" charset="0"/>
-                <a:cs typeface="Tahoma" panose="020B0604030504040204" pitchFamily="34" charset="0"/>
-              </a:rPr>
-            </a:br>
-            <a:r>
-              <a:rPr lang="en-US" dirty="0">
-                <a:latin typeface="Tahoma" panose="020B0604030504040204" pitchFamily="34" charset="0"/>
-                <a:ea typeface="Tahoma" panose="020B0604030504040204" pitchFamily="34" charset="0"/>
-                <a:cs typeface="Tahoma" panose="020B0604030504040204" pitchFamily="34" charset="0"/>
-              </a:rPr>
-              <a:t>(each citizenship have a lot of passport)</a:t>
+              <a:rPr lang="en-US" dirty="0"/>
+              <a:t>CRUD Party Relationship Type</a:t>
             </a:r>
           </a:p>
           <a:p>
@@ -5203,12 +5213,8 @@
               </a:spcBef>
             </a:pPr>
             <a:r>
-              <a:rPr lang="en-US" dirty="0">
-                <a:latin typeface="Tahoma" panose="020B0604030504040204" pitchFamily="34" charset="0"/>
-                <a:ea typeface="Tahoma" panose="020B0604030504040204" pitchFamily="34" charset="0"/>
-                <a:cs typeface="Tahoma" panose="020B0604030504040204" pitchFamily="34" charset="0"/>
-              </a:rPr>
-              <a:t>CRUD EEOC classification (inside person detail page)</a:t>
+              <a:rPr lang="en-US" dirty="0"/>
+              <a:t>CRUD Party Relationship Status Type</a:t>
             </a:r>
           </a:p>
           <a:p>
@@ -5218,18 +5224,9 @@
               </a:spcBef>
             </a:pPr>
             <a:r>
-              <a:rPr lang="en-US" dirty="0">
-                <a:latin typeface="Tahoma" panose="020B0604030504040204" pitchFamily="34" charset="0"/>
-                <a:ea typeface="Tahoma" panose="020B0604030504040204" pitchFamily="34" charset="0"/>
-                <a:cs typeface="Tahoma" panose="020B0604030504040204" pitchFamily="34" charset="0"/>
-              </a:rPr>
-              <a:t>CRUD Income classification (inside person detail page)</a:t>
-            </a:r>
-            <a:endParaRPr lang="th-TH" dirty="0">
-              <a:latin typeface="Tahoma" panose="020B0604030504040204" pitchFamily="34" charset="0"/>
-              <a:ea typeface="Tahoma" panose="020B0604030504040204" pitchFamily="34" charset="0"/>
-              <a:cs typeface="Tahoma" panose="020B0604030504040204" pitchFamily="34" charset="0"/>
-            </a:endParaRPr>
+              <a:rPr lang="en-US" dirty="0"/>
+              <a:t>CRUD Priority Type </a:t>
+            </a:r>
           </a:p>
           <a:p>
             <a:pPr>
@@ -5238,12 +5235,8 @@
               </a:spcBef>
             </a:pPr>
             <a:r>
-              <a:rPr lang="en-US" dirty="0">
-                <a:latin typeface="Tahoma" panose="020B0604030504040204" pitchFamily="34" charset="0"/>
-                <a:ea typeface="Tahoma" panose="020B0604030504040204" pitchFamily="34" charset="0"/>
-                <a:cs typeface="Tahoma" panose="020B0604030504040204" pitchFamily="34" charset="0"/>
-              </a:rPr>
-              <a:t>CRUD Organization</a:t>
+              <a:rPr lang="en-US" dirty="0"/>
+              <a:t>CRUD Communication Event Status Type</a:t>
             </a:r>
           </a:p>
           <a:p>
@@ -5253,12 +5246,8 @@
               </a:spcBef>
             </a:pPr>
             <a:r>
-              <a:rPr lang="en-US" dirty="0">
-                <a:latin typeface="Tahoma" panose="020B0604030504040204" pitchFamily="34" charset="0"/>
-                <a:ea typeface="Tahoma" panose="020B0604030504040204" pitchFamily="34" charset="0"/>
-                <a:cs typeface="Tahoma" panose="020B0604030504040204" pitchFamily="34" charset="0"/>
-              </a:rPr>
-              <a:t>CRUD Industry classification   (inside organization detail page)</a:t>
+              <a:rPr lang="en-US" dirty="0"/>
+              <a:t>CRUD Contact Mechanism Type</a:t>
             </a:r>
           </a:p>
           <a:p>
@@ -5268,35 +5257,17 @@
               </a:spcBef>
             </a:pPr>
             <a:r>
-              <a:rPr lang="en-US" dirty="0">
-                <a:latin typeface="Tahoma" panose="020B0604030504040204" pitchFamily="34" charset="0"/>
-                <a:ea typeface="Tahoma" panose="020B0604030504040204" pitchFamily="34" charset="0"/>
-                <a:cs typeface="Tahoma" panose="020B0604030504040204" pitchFamily="34" charset="0"/>
-              </a:rPr>
-              <a:t>CRUD Size classification (inside organization detail page)</a:t>
-            </a:r>
-          </a:p>
-          <a:p>
-            <a:pPr>
-              <a:spcBef>
-                <a:spcPts val="1800"/>
-              </a:spcBef>
-            </a:pPr>
-            <a:r>
-              <a:rPr lang="en-US" dirty="0">
-                <a:latin typeface="Tahoma" panose="020B0604030504040204" pitchFamily="34" charset="0"/>
-                <a:ea typeface="Tahoma" panose="020B0604030504040204" pitchFamily="34" charset="0"/>
-                <a:cs typeface="Tahoma" panose="020B0604030504040204" pitchFamily="34" charset="0"/>
-              </a:rPr>
-              <a:t>CRUD Minority classification (inside organization detail page)</a:t>
-            </a:r>
+              <a:rPr lang="en-US" dirty="0"/>
+              <a:t>CRUD Communication Event Purpose Type </a:t>
+            </a:r>
+            <a:endParaRPr lang="th-TH" dirty="0"/>
           </a:p>
         </p:txBody>
       </p:sp>
     </p:spTree>
     <p:extLst>
       <p:ext uri="{BB962C8B-B14F-4D97-AF65-F5344CB8AC3E}">
-        <p14:creationId xmlns:p14="http://schemas.microsoft.com/office/powerpoint/2010/main" val="2551878310"/>
+        <p14:creationId xmlns:p14="http://schemas.microsoft.com/office/powerpoint/2010/main" val="4069295476"/>
       </p:ext>
     </p:extLst>
   </p:cSld>
@@ -5328,6 +5299,237 @@
           <p:cNvPr id="2" name="Title 1">
             <a:extLst>
               <a:ext uri="{FF2B5EF4-FFF2-40B4-BE49-F238E27FC236}">
+                <a16:creationId xmlns:a16="http://schemas.microsoft.com/office/drawing/2014/main" id="{74D28A83-C5C3-E4DD-BF35-31E41D4EFEBD}"/>
+              </a:ext>
+            </a:extLst>
+          </p:cNvPr>
+          <p:cNvSpPr>
+            <a:spLocks noGrp="1"/>
+          </p:cNvSpPr>
+          <p:nvPr>
+            <p:ph type="title"/>
+          </p:nvPr>
+        </p:nvSpPr>
+        <p:spPr/>
+        <p:txBody>
+          <a:bodyPr/>
+          <a:lstStyle/>
+          <a:p>
+            <a:r>
+              <a:rPr lang="en-US" dirty="0">
+                <a:latin typeface="Tahoma" panose="020B0604030504040204" pitchFamily="34" charset="0"/>
+                <a:ea typeface="Tahoma" panose="020B0604030504040204" pitchFamily="34" charset="0"/>
+                <a:cs typeface="Tahoma" panose="020B0604030504040204" pitchFamily="34" charset="0"/>
+              </a:rPr>
+              <a:t>Info Layer</a:t>
+            </a:r>
+            <a:endParaRPr lang="th-TH" dirty="0">
+              <a:latin typeface="Tahoma" panose="020B0604030504040204" pitchFamily="34" charset="0"/>
+              <a:ea typeface="Tahoma" panose="020B0604030504040204" pitchFamily="34" charset="0"/>
+              <a:cs typeface="Tahoma" panose="020B0604030504040204" pitchFamily="34" charset="0"/>
+            </a:endParaRPr>
+          </a:p>
+        </p:txBody>
+      </p:sp>
+      <p:sp>
+        <p:nvSpPr>
+          <p:cNvPr id="3" name="Content Placeholder 2">
+            <a:extLst>
+              <a:ext uri="{FF2B5EF4-FFF2-40B4-BE49-F238E27FC236}">
+                <a16:creationId xmlns:a16="http://schemas.microsoft.com/office/drawing/2014/main" id="{9A438D87-5470-28F1-F584-4BDBDDC7B9D7}"/>
+              </a:ext>
+            </a:extLst>
+          </p:cNvPr>
+          <p:cNvSpPr>
+            <a:spLocks noGrp="1"/>
+          </p:cNvSpPr>
+          <p:nvPr>
+            <p:ph idx="1"/>
+          </p:nvPr>
+        </p:nvSpPr>
+        <p:spPr/>
+        <p:txBody>
+          <a:bodyPr>
+            <a:normAutofit fontScale="92500" lnSpcReduction="20000"/>
+          </a:bodyPr>
+          <a:lstStyle/>
+          <a:p>
+            <a:pPr>
+              <a:spcBef>
+                <a:spcPts val="1800"/>
+              </a:spcBef>
+            </a:pPr>
+            <a:r>
+              <a:rPr lang="en-US" dirty="0">
+                <a:latin typeface="Tahoma" panose="020B0604030504040204" pitchFamily="34" charset="0"/>
+                <a:ea typeface="Tahoma" panose="020B0604030504040204" pitchFamily="34" charset="0"/>
+                <a:cs typeface="Tahoma" panose="020B0604030504040204" pitchFamily="34" charset="0"/>
+              </a:rPr>
+              <a:t>CRUD Person</a:t>
+            </a:r>
+          </a:p>
+          <a:p>
+            <a:pPr>
+              <a:spcBef>
+                <a:spcPts val="1800"/>
+              </a:spcBef>
+            </a:pPr>
+            <a:r>
+              <a:rPr lang="en-US" dirty="0">
+                <a:latin typeface="Tahoma" panose="020B0604030504040204" pitchFamily="34" charset="0"/>
+                <a:ea typeface="Tahoma" panose="020B0604030504040204" pitchFamily="34" charset="0"/>
+                <a:cs typeface="Tahoma" panose="020B0604030504040204" pitchFamily="34" charset="0"/>
+              </a:rPr>
+              <a:t>CRUD Passport (inside person detail page) </a:t>
+            </a:r>
+            <a:br>
+              <a:rPr lang="en-US" dirty="0">
+                <a:latin typeface="Tahoma" panose="020B0604030504040204" pitchFamily="34" charset="0"/>
+                <a:ea typeface="Tahoma" panose="020B0604030504040204" pitchFamily="34" charset="0"/>
+                <a:cs typeface="Tahoma" panose="020B0604030504040204" pitchFamily="34" charset="0"/>
+              </a:rPr>
+            </a:br>
+            <a:r>
+              <a:rPr lang="en-US" dirty="0">
+                <a:latin typeface="Tahoma" panose="020B0604030504040204" pitchFamily="34" charset="0"/>
+                <a:ea typeface="Tahoma" panose="020B0604030504040204" pitchFamily="34" charset="0"/>
+                <a:cs typeface="Tahoma" panose="020B0604030504040204" pitchFamily="34" charset="0"/>
+              </a:rPr>
+              <a:t>(each citizenship have a lot of passport)</a:t>
+            </a:r>
+          </a:p>
+          <a:p>
+            <a:pPr>
+              <a:spcBef>
+                <a:spcPts val="1800"/>
+              </a:spcBef>
+            </a:pPr>
+            <a:r>
+              <a:rPr lang="en-US" dirty="0">
+                <a:latin typeface="Tahoma" panose="020B0604030504040204" pitchFamily="34" charset="0"/>
+                <a:ea typeface="Tahoma" panose="020B0604030504040204" pitchFamily="34" charset="0"/>
+                <a:cs typeface="Tahoma" panose="020B0604030504040204" pitchFamily="34" charset="0"/>
+              </a:rPr>
+              <a:t>CRUD EEOC classification (inside person detail page)</a:t>
+            </a:r>
+          </a:p>
+          <a:p>
+            <a:pPr>
+              <a:spcBef>
+                <a:spcPts val="1800"/>
+              </a:spcBef>
+            </a:pPr>
+            <a:r>
+              <a:rPr lang="en-US" dirty="0">
+                <a:latin typeface="Tahoma" panose="020B0604030504040204" pitchFamily="34" charset="0"/>
+                <a:ea typeface="Tahoma" panose="020B0604030504040204" pitchFamily="34" charset="0"/>
+                <a:cs typeface="Tahoma" panose="020B0604030504040204" pitchFamily="34" charset="0"/>
+              </a:rPr>
+              <a:t>CRUD Income classification (inside person detail page)</a:t>
+            </a:r>
+            <a:endParaRPr lang="th-TH" dirty="0">
+              <a:latin typeface="Tahoma" panose="020B0604030504040204" pitchFamily="34" charset="0"/>
+              <a:ea typeface="Tahoma" panose="020B0604030504040204" pitchFamily="34" charset="0"/>
+              <a:cs typeface="Tahoma" panose="020B0604030504040204" pitchFamily="34" charset="0"/>
+            </a:endParaRPr>
+          </a:p>
+          <a:p>
+            <a:pPr>
+              <a:spcBef>
+                <a:spcPts val="1800"/>
+              </a:spcBef>
+            </a:pPr>
+            <a:r>
+              <a:rPr lang="en-US" dirty="0">
+                <a:latin typeface="Tahoma" panose="020B0604030504040204" pitchFamily="34" charset="0"/>
+                <a:ea typeface="Tahoma" panose="020B0604030504040204" pitchFamily="34" charset="0"/>
+                <a:cs typeface="Tahoma" panose="020B0604030504040204" pitchFamily="34" charset="0"/>
+              </a:rPr>
+              <a:t>CRUD Organization</a:t>
+            </a:r>
+          </a:p>
+          <a:p>
+            <a:pPr>
+              <a:spcBef>
+                <a:spcPts val="1800"/>
+              </a:spcBef>
+            </a:pPr>
+            <a:r>
+              <a:rPr lang="en-US" dirty="0">
+                <a:latin typeface="Tahoma" panose="020B0604030504040204" pitchFamily="34" charset="0"/>
+                <a:ea typeface="Tahoma" panose="020B0604030504040204" pitchFamily="34" charset="0"/>
+                <a:cs typeface="Tahoma" panose="020B0604030504040204" pitchFamily="34" charset="0"/>
+              </a:rPr>
+              <a:t>CRUD Industry classification   (inside organization detail page)</a:t>
+            </a:r>
+          </a:p>
+          <a:p>
+            <a:pPr>
+              <a:spcBef>
+                <a:spcPts val="1800"/>
+              </a:spcBef>
+            </a:pPr>
+            <a:r>
+              <a:rPr lang="en-US" dirty="0">
+                <a:latin typeface="Tahoma" panose="020B0604030504040204" pitchFamily="34" charset="0"/>
+                <a:ea typeface="Tahoma" panose="020B0604030504040204" pitchFamily="34" charset="0"/>
+                <a:cs typeface="Tahoma" panose="020B0604030504040204" pitchFamily="34" charset="0"/>
+              </a:rPr>
+              <a:t>CRUD Size classification (inside organization detail page)</a:t>
+            </a:r>
+          </a:p>
+          <a:p>
+            <a:pPr>
+              <a:spcBef>
+                <a:spcPts val="1800"/>
+              </a:spcBef>
+            </a:pPr>
+            <a:r>
+              <a:rPr lang="en-US" dirty="0">
+                <a:latin typeface="Tahoma" panose="020B0604030504040204" pitchFamily="34" charset="0"/>
+                <a:ea typeface="Tahoma" panose="020B0604030504040204" pitchFamily="34" charset="0"/>
+                <a:cs typeface="Tahoma" panose="020B0604030504040204" pitchFamily="34" charset="0"/>
+              </a:rPr>
+              <a:t>CRUD Minority classification (inside organization detail page)</a:t>
+            </a:r>
+          </a:p>
+        </p:txBody>
+      </p:sp>
+    </p:spTree>
+    <p:extLst>
+      <p:ext uri="{BB962C8B-B14F-4D97-AF65-F5344CB8AC3E}">
+        <p14:creationId xmlns:p14="http://schemas.microsoft.com/office/powerpoint/2010/main" val="2551878310"/>
+      </p:ext>
+    </p:extLst>
+  </p:cSld>
+  <p:clrMapOvr>
+    <a:masterClrMapping/>
+  </p:clrMapOvr>
+</p:sld>
+</file>
+
+<file path=ppt/slides/slide8.xml><?xml version="1.0" encoding="utf-8"?>
+<p:sld xmlns:a="http://schemas.openxmlformats.org/drawingml/2006/main" xmlns:r="http://schemas.openxmlformats.org/officeDocument/2006/relationships" xmlns:p="http://schemas.openxmlformats.org/presentationml/2006/main">
+  <p:cSld>
+    <p:spTree>
+      <p:nvGrpSpPr>
+        <p:cNvPr id="1" name=""/>
+        <p:cNvGrpSpPr/>
+        <p:nvPr/>
+      </p:nvGrpSpPr>
+      <p:grpSpPr>
+        <a:xfrm>
+          <a:off x="0" y="0"/>
+          <a:ext cx="0" cy="0"/>
+          <a:chOff x="0" y="0"/>
+          <a:chExt cx="0" cy="0"/>
+        </a:xfrm>
+      </p:grpSpPr>
+      <p:sp>
+        <p:nvSpPr>
+          <p:cNvPr id="2" name="Title 1">
+            <a:extLst>
+              <a:ext uri="{FF2B5EF4-FFF2-40B4-BE49-F238E27FC236}">
                 <a16:creationId xmlns:a16="http://schemas.microsoft.com/office/drawing/2014/main" id="{3960CBE3-7BD1-724A-E0FF-066B779B64FF}"/>
               </a:ext>
             </a:extLst>
@@ -5423,7 +5625,7 @@
 </p:sld>
 </file>
 
-<file path=ppt/slides/slide8.xml><?xml version="1.0" encoding="utf-8"?>
+<file path=ppt/slides/slide9.xml><?xml version="1.0" encoding="utf-8"?>
 <p:sld xmlns:a="http://schemas.openxmlformats.org/drawingml/2006/main" xmlns:r="http://schemas.openxmlformats.org/officeDocument/2006/relationships" xmlns:p="http://schemas.openxmlformats.org/presentationml/2006/main">
   <p:cSld>
     <p:spTree>

</xml_diff>